<commit_message>
modify icon positions appshed
modify icon positions appshed
</commit_message>
<xml_diff>
--- a/14appshed/01 Mobile APP Development .pptx
+++ b/14appshed/01 Mobile APP Development .pptx
@@ -117,7 +117,7 @@
   </p:defaultTextStyle>
   <p:extLst>
     <p:ext uri="{EFAFB233-063F-42B5-8137-9DF3F51BA10A}">
-      <p15:sldGuideLst xmlns:p15="http://schemas.microsoft.com/office/powerpoint/2012/main" xmlns=""/>
+      <p15:sldGuideLst xmlns="" xmlns:p15="http://schemas.microsoft.com/office/powerpoint/2012/main"/>
     </p:ext>
   </p:extLst>
 </p:presentation>
@@ -206,7 +206,7 @@
             <a:fld id="{FB4EF173-EE73-4BAD-8A5E-AB9217A9A545}" type="datetimeFigureOut">
               <a:rPr lang="en-GB" smtClean="0"/>
               <a:pPr/>
-              <a:t>15/05/2016</a:t>
+              <a:t>05/06/2016</a:t>
             </a:fld>
             <a:endParaRPr lang="en-GB"/>
           </a:p>
@@ -375,7 +375,7 @@
     </p:spTree>
     <p:extLst>
       <p:ext uri="{BB962C8B-B14F-4D97-AF65-F5344CB8AC3E}">
-        <p14:creationId xmlns:p14="http://schemas.microsoft.com/office/powerpoint/2010/main" xmlns="" val="1207339325"/>
+        <p14:creationId xmlns="" xmlns:p14="http://schemas.microsoft.com/office/powerpoint/2010/main" val="1207339325"/>
       </p:ext>
     </p:extLst>
   </p:cSld>
@@ -550,7 +550,7 @@
     </p:spTree>
     <p:extLst>
       <p:ext uri="{BB962C8B-B14F-4D97-AF65-F5344CB8AC3E}">
-        <p14:creationId xmlns:p14="http://schemas.microsoft.com/office/powerpoint/2010/main" xmlns="" val="1539958682"/>
+        <p14:creationId xmlns="" xmlns:p14="http://schemas.microsoft.com/office/powerpoint/2010/main" val="1539958682"/>
       </p:ext>
     </p:extLst>
   </p:cSld>
@@ -692,7 +692,7 @@
             <a:fld id="{EA9755EE-16FB-420F-8F56-F1FDA8C730B5}" type="datetimeFigureOut">
               <a:rPr lang="en-GB" smtClean="0"/>
               <a:pPr/>
-              <a:t>15/05/2016</a:t>
+              <a:t>05/06/2016</a:t>
             </a:fld>
             <a:endParaRPr lang="en-GB"/>
           </a:p>
@@ -744,7 +744,7 @@
     </p:spTree>
     <p:extLst>
       <p:ext uri="{BB962C8B-B14F-4D97-AF65-F5344CB8AC3E}">
-        <p14:creationId xmlns:p14="http://schemas.microsoft.com/office/powerpoint/2010/main" xmlns="" val="1471137086"/>
+        <p14:creationId xmlns="" xmlns:p14="http://schemas.microsoft.com/office/powerpoint/2010/main" val="1471137086"/>
       </p:ext>
     </p:extLst>
   </p:cSld>
@@ -864,7 +864,7 @@
             <a:fld id="{EA9755EE-16FB-420F-8F56-F1FDA8C730B5}" type="datetimeFigureOut">
               <a:rPr lang="en-GB" smtClean="0"/>
               <a:pPr/>
-              <a:t>15/05/2016</a:t>
+              <a:t>05/06/2016</a:t>
             </a:fld>
             <a:endParaRPr lang="en-GB"/>
           </a:p>
@@ -916,7 +916,7 @@
     </p:spTree>
     <p:extLst>
       <p:ext uri="{BB962C8B-B14F-4D97-AF65-F5344CB8AC3E}">
-        <p14:creationId xmlns:p14="http://schemas.microsoft.com/office/powerpoint/2010/main" xmlns="" val="1905983469"/>
+        <p14:creationId xmlns="" xmlns:p14="http://schemas.microsoft.com/office/powerpoint/2010/main" val="1905983469"/>
       </p:ext>
     </p:extLst>
   </p:cSld>
@@ -1046,7 +1046,7 @@
             <a:fld id="{EA9755EE-16FB-420F-8F56-F1FDA8C730B5}" type="datetimeFigureOut">
               <a:rPr lang="en-GB" smtClean="0"/>
               <a:pPr/>
-              <a:t>15/05/2016</a:t>
+              <a:t>05/06/2016</a:t>
             </a:fld>
             <a:endParaRPr lang="en-GB"/>
           </a:p>
@@ -1098,7 +1098,7 @@
     </p:spTree>
     <p:extLst>
       <p:ext uri="{BB962C8B-B14F-4D97-AF65-F5344CB8AC3E}">
-        <p14:creationId xmlns:p14="http://schemas.microsoft.com/office/powerpoint/2010/main" xmlns="" val="2065299772"/>
+        <p14:creationId xmlns="" xmlns:p14="http://schemas.microsoft.com/office/powerpoint/2010/main" val="2065299772"/>
       </p:ext>
     </p:extLst>
   </p:cSld>
@@ -1218,7 +1218,7 @@
             <a:fld id="{EA9755EE-16FB-420F-8F56-F1FDA8C730B5}" type="datetimeFigureOut">
               <a:rPr lang="en-GB" smtClean="0"/>
               <a:pPr/>
-              <a:t>15/05/2016</a:t>
+              <a:t>05/06/2016</a:t>
             </a:fld>
             <a:endParaRPr lang="en-GB"/>
           </a:p>
@@ -1270,7 +1270,7 @@
     </p:spTree>
     <p:extLst>
       <p:ext uri="{BB962C8B-B14F-4D97-AF65-F5344CB8AC3E}">
-        <p14:creationId xmlns:p14="http://schemas.microsoft.com/office/powerpoint/2010/main" xmlns="" val="2034421332"/>
+        <p14:creationId xmlns="" xmlns:p14="http://schemas.microsoft.com/office/powerpoint/2010/main" val="2034421332"/>
       </p:ext>
     </p:extLst>
   </p:cSld>
@@ -1466,7 +1466,7 @@
             <a:fld id="{EA9755EE-16FB-420F-8F56-F1FDA8C730B5}" type="datetimeFigureOut">
               <a:rPr lang="en-GB" smtClean="0"/>
               <a:pPr/>
-              <a:t>15/05/2016</a:t>
+              <a:t>05/06/2016</a:t>
             </a:fld>
             <a:endParaRPr lang="en-GB"/>
           </a:p>
@@ -1518,7 +1518,7 @@
     </p:spTree>
     <p:extLst>
       <p:ext uri="{BB962C8B-B14F-4D97-AF65-F5344CB8AC3E}">
-        <p14:creationId xmlns:p14="http://schemas.microsoft.com/office/powerpoint/2010/main" xmlns="" val="1110019855"/>
+        <p14:creationId xmlns="" xmlns:p14="http://schemas.microsoft.com/office/powerpoint/2010/main" val="1110019855"/>
       </p:ext>
     </p:extLst>
   </p:cSld>
@@ -1700,7 +1700,7 @@
             <a:fld id="{EA9755EE-16FB-420F-8F56-F1FDA8C730B5}" type="datetimeFigureOut">
               <a:rPr lang="en-GB" smtClean="0"/>
               <a:pPr/>
-              <a:t>15/05/2016</a:t>
+              <a:t>05/06/2016</a:t>
             </a:fld>
             <a:endParaRPr lang="en-GB"/>
           </a:p>
@@ -1752,7 +1752,7 @@
     </p:spTree>
     <p:extLst>
       <p:ext uri="{BB962C8B-B14F-4D97-AF65-F5344CB8AC3E}">
-        <p14:creationId xmlns:p14="http://schemas.microsoft.com/office/powerpoint/2010/main" xmlns="" val="279895687"/>
+        <p14:creationId xmlns="" xmlns:p14="http://schemas.microsoft.com/office/powerpoint/2010/main" val="279895687"/>
       </p:ext>
     </p:extLst>
   </p:cSld>
@@ -2069,7 +2069,7 @@
             <a:fld id="{EA9755EE-16FB-420F-8F56-F1FDA8C730B5}" type="datetimeFigureOut">
               <a:rPr lang="en-GB" smtClean="0"/>
               <a:pPr/>
-              <a:t>15/05/2016</a:t>
+              <a:t>05/06/2016</a:t>
             </a:fld>
             <a:endParaRPr lang="en-GB"/>
           </a:p>
@@ -2121,7 +2121,7 @@
     </p:spTree>
     <p:extLst>
       <p:ext uri="{BB962C8B-B14F-4D97-AF65-F5344CB8AC3E}">
-        <p14:creationId xmlns:p14="http://schemas.microsoft.com/office/powerpoint/2010/main" xmlns="" val="3266156182"/>
+        <p14:creationId xmlns="" xmlns:p14="http://schemas.microsoft.com/office/powerpoint/2010/main" val="3266156182"/>
       </p:ext>
     </p:extLst>
   </p:cSld>
@@ -2189,7 +2189,7 @@
             <a:fld id="{EA9755EE-16FB-420F-8F56-F1FDA8C730B5}" type="datetimeFigureOut">
               <a:rPr lang="en-GB" smtClean="0"/>
               <a:pPr/>
-              <a:t>15/05/2016</a:t>
+              <a:t>05/06/2016</a:t>
             </a:fld>
             <a:endParaRPr lang="en-GB"/>
           </a:p>
@@ -2241,7 +2241,7 @@
     </p:spTree>
     <p:extLst>
       <p:ext uri="{BB962C8B-B14F-4D97-AF65-F5344CB8AC3E}">
-        <p14:creationId xmlns:p14="http://schemas.microsoft.com/office/powerpoint/2010/main" xmlns="" val="269646364"/>
+        <p14:creationId xmlns="" xmlns:p14="http://schemas.microsoft.com/office/powerpoint/2010/main" val="269646364"/>
       </p:ext>
     </p:extLst>
   </p:cSld>
@@ -2286,7 +2286,7 @@
             <a:fld id="{EA9755EE-16FB-420F-8F56-F1FDA8C730B5}" type="datetimeFigureOut">
               <a:rPr lang="en-GB" smtClean="0"/>
               <a:pPr/>
-              <a:t>15/05/2016</a:t>
+              <a:t>05/06/2016</a:t>
             </a:fld>
             <a:endParaRPr lang="en-GB"/>
           </a:p>
@@ -2338,7 +2338,7 @@
     </p:spTree>
     <p:extLst>
       <p:ext uri="{BB962C8B-B14F-4D97-AF65-F5344CB8AC3E}">
-        <p14:creationId xmlns:p14="http://schemas.microsoft.com/office/powerpoint/2010/main" xmlns="" val="1653270506"/>
+        <p14:creationId xmlns="" xmlns:p14="http://schemas.microsoft.com/office/powerpoint/2010/main" val="1653270506"/>
       </p:ext>
     </p:extLst>
   </p:cSld>
@@ -2565,7 +2565,7 @@
             <a:fld id="{EA9755EE-16FB-420F-8F56-F1FDA8C730B5}" type="datetimeFigureOut">
               <a:rPr lang="en-GB" smtClean="0"/>
               <a:pPr/>
-              <a:t>15/05/2016</a:t>
+              <a:t>05/06/2016</a:t>
             </a:fld>
             <a:endParaRPr lang="en-GB"/>
           </a:p>
@@ -2617,7 +2617,7 @@
     </p:spTree>
     <p:extLst>
       <p:ext uri="{BB962C8B-B14F-4D97-AF65-F5344CB8AC3E}">
-        <p14:creationId xmlns:p14="http://schemas.microsoft.com/office/powerpoint/2010/main" xmlns="" val="2788355770"/>
+        <p14:creationId xmlns="" xmlns:p14="http://schemas.microsoft.com/office/powerpoint/2010/main" val="2788355770"/>
       </p:ext>
     </p:extLst>
   </p:cSld>
@@ -2820,7 +2820,7 @@
             <a:fld id="{EA9755EE-16FB-420F-8F56-F1FDA8C730B5}" type="datetimeFigureOut">
               <a:rPr lang="en-GB" smtClean="0"/>
               <a:pPr/>
-              <a:t>15/05/2016</a:t>
+              <a:t>05/06/2016</a:t>
             </a:fld>
             <a:endParaRPr lang="en-GB"/>
           </a:p>
@@ -2872,7 +2872,7 @@
     </p:spTree>
     <p:extLst>
       <p:ext uri="{BB962C8B-B14F-4D97-AF65-F5344CB8AC3E}">
-        <p14:creationId xmlns:p14="http://schemas.microsoft.com/office/powerpoint/2010/main" xmlns="" val="1966819057"/>
+        <p14:creationId xmlns="" xmlns:p14="http://schemas.microsoft.com/office/powerpoint/2010/main" val="1966819057"/>
       </p:ext>
     </p:extLst>
   </p:cSld>
@@ -3040,7 +3040,7 @@
             <a:fld id="{EA9755EE-16FB-420F-8F56-F1FDA8C730B5}" type="datetimeFigureOut">
               <a:rPr lang="en-GB" smtClean="0"/>
               <a:pPr/>
-              <a:t>15/05/2016</a:t>
+              <a:t>05/06/2016</a:t>
             </a:fld>
             <a:endParaRPr lang="en-GB" dirty="0"/>
           </a:p>
@@ -3132,7 +3132,7 @@
     </p:spTree>
     <p:extLst>
       <p:ext uri="{BB962C8B-B14F-4D97-AF65-F5344CB8AC3E}">
-        <p14:creationId xmlns:p14="http://schemas.microsoft.com/office/powerpoint/2010/main" xmlns="" val="1023516090"/>
+        <p14:creationId xmlns="" xmlns:p14="http://schemas.microsoft.com/office/powerpoint/2010/main" val="1023516090"/>
       </p:ext>
     </p:extLst>
   </p:cSld>
@@ -3493,11 +3493,7 @@
           <a:p>
             <a:r>
               <a:rPr lang="en-GB" dirty="0" smtClean="0"/>
-              <a:t>Researching APP’s – Lesson </a:t>
-            </a:r>
-            <a:r>
-              <a:rPr lang="en-GB" dirty="0" smtClean="0"/>
-              <a:t>1</a:t>
+              <a:t>Researching APP’s – Lesson 1</a:t>
             </a:r>
             <a:endParaRPr lang="en-GB" dirty="0"/>
           </a:p>
@@ -3536,7 +3532,7 @@
     </p:spTree>
     <p:extLst>
       <p:ext uri="{BB962C8B-B14F-4D97-AF65-F5344CB8AC3E}">
-        <p14:creationId xmlns:p14="http://schemas.microsoft.com/office/powerpoint/2010/main" xmlns="" val="344561993"/>
+        <p14:creationId xmlns="" xmlns:p14="http://schemas.microsoft.com/office/powerpoint/2010/main" val="344561993"/>
       </p:ext>
     </p:extLst>
   </p:cSld>
@@ -3634,7 +3630,7 @@
           <a:blip r:embed="rId2" cstate="print">
             <a:extLst>
               <a:ext uri="{28A0092B-C50C-407E-A947-70E740481C1C}">
-                <a14:useLocalDpi xmlns:a14="http://schemas.microsoft.com/office/drawing/2010/main" xmlns="" val="0"/>
+                <a14:useLocalDpi xmlns="" xmlns:a14="http://schemas.microsoft.com/office/drawing/2010/main" val="0"/>
               </a:ext>
             </a:extLst>
           </a:blip>
@@ -3655,14 +3651,14 @@
           </a:ln>
           <a:extLst>
             <a:ext uri="{909E8E84-426E-40DD-AFC4-6F175D3DCCD1}">
-              <a14:hiddenFill xmlns:a14="http://schemas.microsoft.com/office/drawing/2010/main" xmlns="">
+              <a14:hiddenFill xmlns="" xmlns:a14="http://schemas.microsoft.com/office/drawing/2010/main">
                 <a:solidFill>
                   <a:schemeClr val="accent1"/>
                 </a:solidFill>
               </a14:hiddenFill>
             </a:ext>
             <a:ext uri="{91240B29-F687-4F45-9708-019B960494DF}">
-              <a14:hiddenLine xmlns:a14="http://schemas.microsoft.com/office/drawing/2010/main" xmlns="" w="9525">
+              <a14:hiddenLine xmlns="" xmlns:a14="http://schemas.microsoft.com/office/drawing/2010/main" w="9525">
                 <a:solidFill>
                   <a:schemeClr val="tx1"/>
                 </a:solidFill>
@@ -3693,7 +3689,7 @@
           <a:noFill/>
           <a:extLst>
             <a:ext uri="{909E8E84-426E-40DD-AFC4-6F175D3DCCD1}">
-              <a14:hiddenFill xmlns:a14="http://schemas.microsoft.com/office/drawing/2010/main" xmlns="">
+              <a14:hiddenFill xmlns="" xmlns:a14="http://schemas.microsoft.com/office/drawing/2010/main">
                 <a:solidFill>
                   <a:srgbClr val="FFFFFF"/>
                 </a:solidFill>
@@ -3725,7 +3721,7 @@
           <a:blip r:embed="rId3" cstate="print">
             <a:extLst>
               <a:ext uri="{28A0092B-C50C-407E-A947-70E740481C1C}">
-                <a14:useLocalDpi xmlns:a14="http://schemas.microsoft.com/office/drawing/2010/main" xmlns="" val="0"/>
+                <a14:useLocalDpi xmlns="" xmlns:a14="http://schemas.microsoft.com/office/drawing/2010/main" val="0"/>
               </a:ext>
             </a:extLst>
           </a:blip>
@@ -3746,14 +3742,14 @@
           </a:ln>
           <a:extLst>
             <a:ext uri="{909E8E84-426E-40DD-AFC4-6F175D3DCCD1}">
-              <a14:hiddenFill xmlns:a14="http://schemas.microsoft.com/office/drawing/2010/main" xmlns="">
+              <a14:hiddenFill xmlns="" xmlns:a14="http://schemas.microsoft.com/office/drawing/2010/main">
                 <a:solidFill>
                   <a:schemeClr val="accent1"/>
                 </a:solidFill>
               </a14:hiddenFill>
             </a:ext>
             <a:ext uri="{91240B29-F687-4F45-9708-019B960494DF}">
-              <a14:hiddenLine xmlns:a14="http://schemas.microsoft.com/office/drawing/2010/main" xmlns="" w="9525">
+              <a14:hiddenLine xmlns="" xmlns:a14="http://schemas.microsoft.com/office/drawing/2010/main" w="9525">
                 <a:solidFill>
                   <a:schemeClr val="tx1"/>
                 </a:solidFill>
@@ -3784,7 +3780,7 @@
           <a:noFill/>
           <a:extLst>
             <a:ext uri="{909E8E84-426E-40DD-AFC4-6F175D3DCCD1}">
-              <a14:hiddenFill xmlns:a14="http://schemas.microsoft.com/office/drawing/2010/main" xmlns="">
+              <a14:hiddenFill xmlns="" xmlns:a14="http://schemas.microsoft.com/office/drawing/2010/main">
                 <a:solidFill>
                   <a:srgbClr val="FFFFFF"/>
                 </a:solidFill>
@@ -3816,7 +3812,7 @@
           <a:blip r:embed="rId4" cstate="print">
             <a:extLst>
               <a:ext uri="{28A0092B-C50C-407E-A947-70E740481C1C}">
-                <a14:useLocalDpi xmlns:a14="http://schemas.microsoft.com/office/drawing/2010/main" xmlns="" val="0"/>
+                <a14:useLocalDpi xmlns="" xmlns:a14="http://schemas.microsoft.com/office/drawing/2010/main" val="0"/>
               </a:ext>
             </a:extLst>
           </a:blip>
@@ -3837,14 +3833,14 @@
           </a:ln>
           <a:extLst>
             <a:ext uri="{909E8E84-426E-40DD-AFC4-6F175D3DCCD1}">
-              <a14:hiddenFill xmlns:a14="http://schemas.microsoft.com/office/drawing/2010/main" xmlns="">
+              <a14:hiddenFill xmlns="" xmlns:a14="http://schemas.microsoft.com/office/drawing/2010/main">
                 <a:solidFill>
                   <a:schemeClr val="accent1"/>
                 </a:solidFill>
               </a14:hiddenFill>
             </a:ext>
             <a:ext uri="{91240B29-F687-4F45-9708-019B960494DF}">
-              <a14:hiddenLine xmlns:a14="http://schemas.microsoft.com/office/drawing/2010/main" xmlns="" w="9525">
+              <a14:hiddenLine xmlns="" xmlns:a14="http://schemas.microsoft.com/office/drawing/2010/main" w="9525">
                 <a:solidFill>
                   <a:schemeClr val="tx1"/>
                 </a:solidFill>
@@ -3859,7 +3855,7 @@
     </p:spTree>
     <p:extLst>
       <p:ext uri="{BB962C8B-B14F-4D97-AF65-F5344CB8AC3E}">
-        <p14:creationId xmlns:p14="http://schemas.microsoft.com/office/powerpoint/2010/main" xmlns="" val="4158567953"/>
+        <p14:creationId xmlns="" xmlns:p14="http://schemas.microsoft.com/office/powerpoint/2010/main" val="4158567953"/>
       </p:ext>
     </p:extLst>
   </p:cSld>
@@ -3988,7 +3984,7 @@
           <a:blip r:embed="rId2" cstate="print">
             <a:extLst>
               <a:ext uri="{28A0092B-C50C-407E-A947-70E740481C1C}">
-                <a14:useLocalDpi xmlns:a14="http://schemas.microsoft.com/office/drawing/2010/main" xmlns="" val="0"/>
+                <a14:useLocalDpi xmlns="" xmlns:a14="http://schemas.microsoft.com/office/drawing/2010/main" val="0"/>
               </a:ext>
             </a:extLst>
           </a:blip>
@@ -4009,14 +4005,14 @@
           </a:ln>
           <a:extLst>
             <a:ext uri="{909E8E84-426E-40DD-AFC4-6F175D3DCCD1}">
-              <a14:hiddenFill xmlns:a14="http://schemas.microsoft.com/office/drawing/2010/main" xmlns="">
+              <a14:hiddenFill xmlns="" xmlns:a14="http://schemas.microsoft.com/office/drawing/2010/main">
                 <a:solidFill>
                   <a:schemeClr val="accent1"/>
                 </a:solidFill>
               </a14:hiddenFill>
             </a:ext>
             <a:ext uri="{91240B29-F687-4F45-9708-019B960494DF}">
-              <a14:hiddenLine xmlns:a14="http://schemas.microsoft.com/office/drawing/2010/main" xmlns="" w="9525">
+              <a14:hiddenLine xmlns="" xmlns:a14="http://schemas.microsoft.com/office/drawing/2010/main" w="9525">
                 <a:solidFill>
                   <a:schemeClr val="tx1"/>
                 </a:solidFill>
@@ -4040,7 +4036,7 @@
           <a:blip r:embed="rId3" cstate="print">
             <a:extLst>
               <a:ext uri="{28A0092B-C50C-407E-A947-70E740481C1C}">
-                <a14:useLocalDpi xmlns:a14="http://schemas.microsoft.com/office/drawing/2010/main" xmlns="" val="0"/>
+                <a14:useLocalDpi xmlns="" xmlns:a14="http://schemas.microsoft.com/office/drawing/2010/main" val="0"/>
               </a:ext>
             </a:extLst>
           </a:blip>
@@ -4061,14 +4057,14 @@
           </a:ln>
           <a:extLst>
             <a:ext uri="{909E8E84-426E-40DD-AFC4-6F175D3DCCD1}">
-              <a14:hiddenFill xmlns:a14="http://schemas.microsoft.com/office/drawing/2010/main" xmlns="">
+              <a14:hiddenFill xmlns="" xmlns:a14="http://schemas.microsoft.com/office/drawing/2010/main">
                 <a:solidFill>
                   <a:schemeClr val="accent1"/>
                 </a:solidFill>
               </a14:hiddenFill>
             </a:ext>
             <a:ext uri="{91240B29-F687-4F45-9708-019B960494DF}">
-              <a14:hiddenLine xmlns:a14="http://schemas.microsoft.com/office/drawing/2010/main" xmlns="" w="9525">
+              <a14:hiddenLine xmlns="" xmlns:a14="http://schemas.microsoft.com/office/drawing/2010/main" w="9525">
                 <a:solidFill>
                   <a:schemeClr val="tx1"/>
                 </a:solidFill>
@@ -4092,7 +4088,7 @@
           <a:blip r:embed="rId4" cstate="print">
             <a:extLst>
               <a:ext uri="{28A0092B-C50C-407E-A947-70E740481C1C}">
-                <a14:useLocalDpi xmlns:a14="http://schemas.microsoft.com/office/drawing/2010/main" xmlns="" val="0"/>
+                <a14:useLocalDpi xmlns="" xmlns:a14="http://schemas.microsoft.com/office/drawing/2010/main" val="0"/>
               </a:ext>
             </a:extLst>
           </a:blip>
@@ -4113,14 +4109,14 @@
           </a:ln>
           <a:extLst>
             <a:ext uri="{909E8E84-426E-40DD-AFC4-6F175D3DCCD1}">
-              <a14:hiddenFill xmlns:a14="http://schemas.microsoft.com/office/drawing/2010/main" xmlns="">
+              <a14:hiddenFill xmlns="" xmlns:a14="http://schemas.microsoft.com/office/drawing/2010/main">
                 <a:solidFill>
                   <a:schemeClr val="accent1"/>
                 </a:solidFill>
               </a14:hiddenFill>
             </a:ext>
             <a:ext uri="{91240B29-F687-4F45-9708-019B960494DF}">
-              <a14:hiddenLine xmlns:a14="http://schemas.microsoft.com/office/drawing/2010/main" xmlns="" w="9525">
+              <a14:hiddenLine xmlns="" xmlns:a14="http://schemas.microsoft.com/office/drawing/2010/main" w="9525">
                 <a:solidFill>
                   <a:schemeClr val="tx1"/>
                 </a:solidFill>
@@ -4135,7 +4131,7 @@
     </p:spTree>
     <p:extLst>
       <p:ext uri="{BB962C8B-B14F-4D97-AF65-F5344CB8AC3E}">
-        <p14:creationId xmlns:p14="http://schemas.microsoft.com/office/powerpoint/2010/main" xmlns="" val="2174526892"/>
+        <p14:creationId xmlns="" xmlns:p14="http://schemas.microsoft.com/office/powerpoint/2010/main" val="2174526892"/>
       </p:ext>
     </p:extLst>
   </p:cSld>
@@ -4233,7 +4229,7 @@
     </p:spTree>
     <p:extLst>
       <p:ext uri="{BB962C8B-B14F-4D97-AF65-F5344CB8AC3E}">
-        <p14:creationId xmlns:p14="http://schemas.microsoft.com/office/powerpoint/2010/main" xmlns="" val="1206069212"/>
+        <p14:creationId xmlns="" xmlns:p14="http://schemas.microsoft.com/office/powerpoint/2010/main" val="1206069212"/>
       </p:ext>
     </p:extLst>
   </p:cSld>
@@ -4325,7 +4321,7 @@
     </p:spTree>
     <p:extLst>
       <p:ext uri="{BB962C8B-B14F-4D97-AF65-F5344CB8AC3E}">
-        <p14:creationId xmlns:p14="http://schemas.microsoft.com/office/powerpoint/2010/main" xmlns="" val="3069146026"/>
+        <p14:creationId xmlns="" xmlns:p14="http://schemas.microsoft.com/office/powerpoint/2010/main" val="3069146026"/>
       </p:ext>
     </p:extLst>
   </p:cSld>
@@ -4369,7 +4365,11 @@
           <a:p>
             <a:r>
               <a:rPr lang="en-GB" dirty="0" smtClean="0"/>
-              <a:t>PAIRED Activity</a:t>
+              <a:t>PAIRED </a:t>
+            </a:r>
+            <a:r>
+              <a:rPr lang="en-GB" dirty="0" smtClean="0"/>
+              <a:t>Activity</a:t>
             </a:r>
             <a:endParaRPr lang="en-GB" dirty="0"/>
           </a:p>
@@ -4385,7 +4385,12 @@
             <p:ph idx="1"/>
           </p:nvPr>
         </p:nvSpPr>
-        <p:spPr/>
+        <p:spPr>
+          <a:xfrm>
+            <a:off x="838200" y="1364343"/>
+            <a:ext cx="10515600" cy="4812620"/>
+          </a:xfrm>
+        </p:spPr>
         <p:txBody>
           <a:bodyPr>
             <a:normAutofit lnSpcReduction="10000"/>
@@ -4396,8 +4401,26 @@
               <a:buNone/>
             </a:pPr>
             <a:r>
+              <a:rPr lang="en-GB" dirty="0" smtClean="0"/>
+              <a:t>Make a folder in your computing folder called </a:t>
+            </a:r>
+            <a:r>
+              <a:rPr lang="en-GB" b="1" dirty="0" err="1" smtClean="0"/>
+              <a:t>mobileapps</a:t>
+            </a:r>
+            <a:endParaRPr lang="en-GB" dirty="0" smtClean="0"/>
+          </a:p>
+          <a:p>
+            <a:pPr marL="0" indent="0">
+              <a:buNone/>
+            </a:pPr>
+            <a:r>
+              <a:rPr lang="en-GB" dirty="0" smtClean="0"/>
+              <a:t>Using </a:t>
+            </a:r>
+            <a:r>
               <a:rPr lang="en-GB" dirty="0"/>
-              <a:t>Using MS Word – list as many APP’s as you can in five minutes!</a:t>
+              <a:t>MS Word – list as many APP’s as you can in five minutes!</a:t>
             </a:r>
           </a:p>
           <a:p>
@@ -4469,7 +4492,7 @@
           <a:blip r:embed="rId2" cstate="print">
             <a:extLst>
               <a:ext uri="{28A0092B-C50C-407E-A947-70E740481C1C}">
-                <a14:useLocalDpi xmlns:a14="http://schemas.microsoft.com/office/drawing/2010/main" xmlns="" val="0"/>
+                <a14:useLocalDpi xmlns="" xmlns:a14="http://schemas.microsoft.com/office/drawing/2010/main" val="0"/>
               </a:ext>
             </a:extLst>
           </a:blip>
@@ -4492,14 +4515,14 @@
           </a:ln>
           <a:extLst>
             <a:ext uri="{909E8E84-426E-40DD-AFC4-6F175D3DCCD1}">
-              <a14:hiddenFill xmlns:a14="http://schemas.microsoft.com/office/drawing/2010/main" xmlns="">
+              <a14:hiddenFill xmlns="" xmlns:a14="http://schemas.microsoft.com/office/drawing/2010/main">
                 <a:solidFill>
                   <a:schemeClr val="accent1"/>
                 </a:solidFill>
               </a14:hiddenFill>
             </a:ext>
             <a:ext uri="{91240B29-F687-4F45-9708-019B960494DF}">
-              <a14:hiddenLine xmlns:a14="http://schemas.microsoft.com/office/drawing/2010/main" xmlns="" w="9525">
+              <a14:hiddenLine xmlns="" xmlns:a14="http://schemas.microsoft.com/office/drawing/2010/main" w="9525">
                 <a:solidFill>
                   <a:schemeClr val="tx1"/>
                 </a:solidFill>
@@ -4514,7 +4537,7 @@
     </p:spTree>
     <p:extLst>
       <p:ext uri="{BB962C8B-B14F-4D97-AF65-F5344CB8AC3E}">
-        <p14:creationId xmlns:p14="http://schemas.microsoft.com/office/powerpoint/2010/main" xmlns="" val="879486926"/>
+        <p14:creationId xmlns="" xmlns:p14="http://schemas.microsoft.com/office/powerpoint/2010/main" val="879486926"/>
       </p:ext>
     </p:extLst>
   </p:cSld>
@@ -4611,7 +4634,7 @@
           <a:noFill/>
           <a:extLst>
             <a:ext uri="{909E8E84-426E-40DD-AFC4-6F175D3DCCD1}">
-              <a14:hiddenFill xmlns:a14="http://schemas.microsoft.com/office/drawing/2010/main" xmlns="">
+              <a14:hiddenFill xmlns="" xmlns:a14="http://schemas.microsoft.com/office/drawing/2010/main">
                 <a:solidFill>
                   <a:srgbClr val="FFFFFF"/>
                 </a:solidFill>
@@ -4643,7 +4666,7 @@
           <a:blip r:embed="rId2" cstate="print">
             <a:extLst>
               <a:ext uri="{28A0092B-C50C-407E-A947-70E740481C1C}">
-                <a14:useLocalDpi xmlns:a14="http://schemas.microsoft.com/office/drawing/2010/main" xmlns="" val="0"/>
+                <a14:useLocalDpi xmlns="" xmlns:a14="http://schemas.microsoft.com/office/drawing/2010/main" val="0"/>
               </a:ext>
             </a:extLst>
           </a:blip>
@@ -4666,14 +4689,14 @@
           </a:ln>
           <a:extLst>
             <a:ext uri="{909E8E84-426E-40DD-AFC4-6F175D3DCCD1}">
-              <a14:hiddenFill xmlns:a14="http://schemas.microsoft.com/office/drawing/2010/main" xmlns="">
+              <a14:hiddenFill xmlns="" xmlns:a14="http://schemas.microsoft.com/office/drawing/2010/main">
                 <a:solidFill>
                   <a:schemeClr val="accent1"/>
                 </a:solidFill>
               </a14:hiddenFill>
             </a:ext>
             <a:ext uri="{91240B29-F687-4F45-9708-019B960494DF}">
-              <a14:hiddenLine xmlns:a14="http://schemas.microsoft.com/office/drawing/2010/main" xmlns="" w="9525">
+              <a14:hiddenLine xmlns="" xmlns:a14="http://schemas.microsoft.com/office/drawing/2010/main" w="9525">
                 <a:solidFill>
                   <a:schemeClr val="tx1"/>
                 </a:solidFill>
@@ -4688,7 +4711,7 @@
     </p:spTree>
     <p:extLst>
       <p:ext uri="{BB962C8B-B14F-4D97-AF65-F5344CB8AC3E}">
-        <p14:creationId xmlns:p14="http://schemas.microsoft.com/office/powerpoint/2010/main" xmlns="" val="2962440347"/>
+        <p14:creationId xmlns="" xmlns:p14="http://schemas.microsoft.com/office/powerpoint/2010/main" val="2962440347"/>
       </p:ext>
     </p:extLst>
   </p:cSld>
@@ -4833,7 +4856,7 @@
           <a:noFill/>
           <a:extLst>
             <a:ext uri="{909E8E84-426E-40DD-AFC4-6F175D3DCCD1}">
-              <a14:hiddenFill xmlns:a14="http://schemas.microsoft.com/office/drawing/2010/main" xmlns="">
+              <a14:hiddenFill xmlns="" xmlns:a14="http://schemas.microsoft.com/office/drawing/2010/main">
                 <a:solidFill>
                   <a:srgbClr val="FFFFFF"/>
                 </a:solidFill>
@@ -4865,7 +4888,7 @@
           <a:blip r:embed="rId2" cstate="print">
             <a:extLst>
               <a:ext uri="{28A0092B-C50C-407E-A947-70E740481C1C}">
-                <a14:useLocalDpi xmlns:a14="http://schemas.microsoft.com/office/drawing/2010/main" xmlns="" val="0"/>
+                <a14:useLocalDpi xmlns="" xmlns:a14="http://schemas.microsoft.com/office/drawing/2010/main" val="0"/>
               </a:ext>
             </a:extLst>
           </a:blip>
@@ -4888,14 +4911,14 @@
           </a:ln>
           <a:extLst>
             <a:ext uri="{909E8E84-426E-40DD-AFC4-6F175D3DCCD1}">
-              <a14:hiddenFill xmlns:a14="http://schemas.microsoft.com/office/drawing/2010/main" xmlns="">
+              <a14:hiddenFill xmlns="" xmlns:a14="http://schemas.microsoft.com/office/drawing/2010/main">
                 <a:solidFill>
                   <a:schemeClr val="accent1"/>
                 </a:solidFill>
               </a14:hiddenFill>
             </a:ext>
             <a:ext uri="{91240B29-F687-4F45-9708-019B960494DF}">
-              <a14:hiddenLine xmlns:a14="http://schemas.microsoft.com/office/drawing/2010/main" xmlns="" w="9525">
+              <a14:hiddenLine xmlns="" xmlns:a14="http://schemas.microsoft.com/office/drawing/2010/main" w="9525">
                 <a:solidFill>
                   <a:schemeClr val="tx1"/>
                 </a:solidFill>
@@ -4910,7 +4933,7 @@
     </p:spTree>
     <p:extLst>
       <p:ext uri="{BB962C8B-B14F-4D97-AF65-F5344CB8AC3E}">
-        <p14:creationId xmlns:p14="http://schemas.microsoft.com/office/powerpoint/2010/main" xmlns="" val="2211562328"/>
+        <p14:creationId xmlns="" xmlns:p14="http://schemas.microsoft.com/office/powerpoint/2010/main" val="2211562328"/>
       </p:ext>
     </p:extLst>
   </p:cSld>
@@ -4980,19 +5003,7 @@
             </a:pPr>
             <a:r>
               <a:rPr lang="en-GB" dirty="0" smtClean="0"/>
-              <a:t>Use the worksheet provided on the </a:t>
-            </a:r>
-            <a:r>
-              <a:rPr lang="en-GB" dirty="0" smtClean="0"/>
-              <a:t>Website</a:t>
-            </a:r>
-            <a:r>
-              <a:rPr lang="en-GB" dirty="0" smtClean="0"/>
-              <a:t> </a:t>
-            </a:r>
-            <a:r>
-              <a:rPr lang="en-GB" dirty="0" smtClean="0"/>
-              <a:t>to add your examples and research more examples of different APP’s.</a:t>
+              <a:t>Use the worksheet provided on the Website to add your examples and research more examples of different APP’s.</a:t>
             </a:r>
           </a:p>
           <a:p>
@@ -5018,7 +5029,7 @@
           <p:nvPr>
             <p:extLst>
               <p:ext uri="{D42A27DB-BD31-4B8C-83A1-F6EECF244321}">
-                <p14:modId xmlns:p14="http://schemas.microsoft.com/office/powerpoint/2010/main" xmlns="" val="393320226"/>
+                <p14:modId xmlns="" xmlns:p14="http://schemas.microsoft.com/office/powerpoint/2010/main" val="393320226"/>
               </p:ext>
             </p:extLst>
           </p:nvPr>
@@ -5279,7 +5290,7 @@
           <a:blip r:embed="rId2" cstate="print">
             <a:extLst>
               <a:ext uri="{28A0092B-C50C-407E-A947-70E740481C1C}">
-                <a14:useLocalDpi xmlns:a14="http://schemas.microsoft.com/office/drawing/2010/main" xmlns="" val="0"/>
+                <a14:useLocalDpi xmlns="" xmlns:a14="http://schemas.microsoft.com/office/drawing/2010/main" val="0"/>
               </a:ext>
             </a:extLst>
           </a:blip>
@@ -5302,14 +5313,14 @@
           </a:ln>
           <a:extLst>
             <a:ext uri="{909E8E84-426E-40DD-AFC4-6F175D3DCCD1}">
-              <a14:hiddenFill xmlns:a14="http://schemas.microsoft.com/office/drawing/2010/main" xmlns="">
+              <a14:hiddenFill xmlns="" xmlns:a14="http://schemas.microsoft.com/office/drawing/2010/main">
                 <a:solidFill>
                   <a:schemeClr val="accent1"/>
                 </a:solidFill>
               </a14:hiddenFill>
             </a:ext>
             <a:ext uri="{91240B29-F687-4F45-9708-019B960494DF}">
-              <a14:hiddenLine xmlns:a14="http://schemas.microsoft.com/office/drawing/2010/main" xmlns="" w="9525">
+              <a14:hiddenLine xmlns="" xmlns:a14="http://schemas.microsoft.com/office/drawing/2010/main" w="9525">
                 <a:solidFill>
                   <a:schemeClr val="tx1"/>
                 </a:solidFill>
@@ -5362,7 +5373,7 @@
     </p:spTree>
     <p:extLst>
       <p:ext uri="{BB962C8B-B14F-4D97-AF65-F5344CB8AC3E}">
-        <p14:creationId xmlns:p14="http://schemas.microsoft.com/office/powerpoint/2010/main" xmlns="" val="248193105"/>
+        <p14:creationId xmlns="" xmlns:p14="http://schemas.microsoft.com/office/powerpoint/2010/main" val="248193105"/>
       </p:ext>
     </p:extLst>
   </p:cSld>
@@ -5627,7 +5638,7 @@
   <a:extraClrSchemeLst/>
   <a:extLst>
     <a:ext uri="{05A4C25C-085E-4340-85A3-A5531E510DB2}">
-      <thm15:themeFamily xmlns:thm15="http://schemas.microsoft.com/office/thememl/2012/main" xmlns="" name="Office Theme" id="{62F939B6-93AF-4DB8-9C6B-D6C7DFDC589F}" vid="{4A3C46E8-61CC-4603-A589-7422A47A8E4A}"/>
+      <thm15:themeFamily xmlns="" xmlns:thm15="http://schemas.microsoft.com/office/thememl/2012/main" name="Office Theme" id="{62F939B6-93AF-4DB8-9C6B-D6C7DFDC589F}" vid="{4A3C46E8-61CC-4603-A589-7422A47A8E4A}"/>
     </a:ext>
   </a:extLst>
 </a:theme>
@@ -5888,7 +5899,7 @@
   <a:extraClrSchemeLst/>
   <a:extLst>
     <a:ext uri="{05A4C25C-085E-4340-85A3-A5531E510DB2}">
-      <thm15:themeFamily xmlns:thm15="http://schemas.microsoft.com/office/thememl/2012/main" xmlns="" name="Office Theme" id="{62F939B6-93AF-4DB8-9C6B-D6C7DFDC589F}" vid="{4A3C46E8-61CC-4603-A589-7422A47A8E4A}"/>
+      <thm15:themeFamily xmlns="" xmlns:thm15="http://schemas.microsoft.com/office/thememl/2012/main" name="Office Theme" id="{62F939B6-93AF-4DB8-9C6B-D6C7DFDC589F}" vid="{4A3C46E8-61CC-4603-A589-7422A47A8E4A}"/>
     </a:ext>
   </a:extLst>
 </a:theme>

</xml_diff>